<commit_message>
Added last version CP 1-6 and CT sesiones 1-17
</commit_message>
<xml_diff>
--- a/Componentes-teoricos/Slide móvil sesión 15 semana 5.pptx
+++ b/Componentes-teoricos/Slide móvil sesión 15 semana 5.pptx
@@ -1,6 +1,6 @@
 
 <file path=ppt/presentation.xml><?xml version="1.0" encoding="utf-8"?>
-<p:presentation xmlns:a="http://schemas.openxmlformats.org/drawingml/2006/main" xmlns:r="http://schemas.openxmlformats.org/officeDocument/2006/relationships" xmlns:mc="http://schemas.openxmlformats.org/markup-compatibility/2006" xmlns:mv="urn:schemas-microsoft-com:mac:vml" xmlns:p="http://schemas.openxmlformats.org/presentationml/2006/main" xmlns:c="http://schemas.openxmlformats.org/drawingml/2006/chart" xmlns:dgm="http://schemas.openxmlformats.org/drawingml/2006/diagram" xmlns:o="urn:schemas-microsoft-com:office:office" xmlns:v="urn:schemas-microsoft-com:vml" xmlns:pvml="urn:schemas-microsoft-com:office:powerpoint" xmlns:com="http://schemas.openxmlformats.org/drawingml/2006/compatibility" xmlns:p14="http://schemas.microsoft.com/office/powerpoint/2010/main" xmlns:p15="http://schemas.microsoft.com/office/powerpoint/2012/main" xmlns:ahyp="http://schemas.microsoft.com/office/drawing/2018/hyperlinkcolor" autoCompressPictures="0" strictFirstAndLastChars="0" saveSubsetFonts="1">
+<p:presentation xmlns:a="http://schemas.openxmlformats.org/drawingml/2006/main" xmlns:r="http://schemas.openxmlformats.org/officeDocument/2006/relationships" xmlns:mc="http://schemas.openxmlformats.org/markup-compatibility/2006" xmlns:mv="urn:schemas-microsoft-com:mac:vml" xmlns:p="http://schemas.openxmlformats.org/presentationml/2006/main" xmlns:c="http://schemas.openxmlformats.org/drawingml/2006/chart" xmlns:dgm="http://schemas.openxmlformats.org/drawingml/2006/diagram" xmlns:o="urn:schemas-microsoft-com:office:office" xmlns:v="urn:schemas-microsoft-com:vml" xmlns:pvml="urn:schemas-microsoft-com:office:powerpoint" xmlns:com="http://schemas.openxmlformats.org/drawingml/2006/compatibility" xmlns:p14="http://schemas.microsoft.com/office/powerpoint/2010/main" xmlns:p15="http://schemas.microsoft.com/office/powerpoint/2012/main" xmlns:ahyp="http://schemas.microsoft.com/office/drawing/2018/hyperlinkcolor" autoCompressPictures="0" embedTrueTypeFonts="1" strictFirstAndLastChars="0" saveSubsetFonts="1">
   <p:sldMasterIdLst>
     <p:sldMasterId id="2147483648" r:id="rId4"/>
   </p:sldMasterIdLst>
@@ -24,9 +24,19 @@
     <p:sldId id="269" r:id="rId19"/>
     <p:sldId id="270" r:id="rId20"/>
     <p:sldId id="271" r:id="rId21"/>
+    <p:sldId id="272" r:id="rId22"/>
   </p:sldIdLst>
   <p:sldSz cy="5143500" cx="9144000"/>
   <p:notesSz cx="6858000" cy="9144000"/>
+  <p:embeddedFontLst>
+    <p:embeddedFont>
+      <p:font typeface="Roboto"/>
+      <p:regular r:id="rId23"/>
+      <p:bold r:id="rId24"/>
+      <p:italic r:id="rId25"/>
+      <p:boldItalic r:id="rId26"/>
+    </p:embeddedFont>
+  </p:embeddedFontLst>
   <p:defaultTextStyle>
     <a:defPPr lvl="0" marR="0" rtl="0" algn="l">
       <a:lnSpc>
@@ -272,7 +282,7 @@
       </p15:sldGuideLst>
     </p:ext>
     <p:ext uri="http://customooxmlschemas.google.com/">
-      <go:slidesCustomData xmlns:go="http://customooxmlschemas.google.com/" r:id="rId22" roundtripDataSignature="AMtx7mie6dYvwuRrSzYCuLD1Jub+XCiooQ=="/>
+      <go:slidesCustomData xmlns:go="http://customooxmlschemas.google.com/" r:id="rId27" roundtripDataSignature="AMtx7miOrHjK4fAh8zRiKp/8JP0qnknyqA=="/>
     </p:ext>
   </p:extLst>
 </p:presentation>
@@ -1677,7 +1687,124 @@
       </p:grpSpPr>
       <p:sp>
         <p:nvSpPr>
-          <p:cNvPr id="241" name="Google Shape;241;p36:notes"/>
+          <p:cNvPr id="241" name="Google Shape;241;g10056b84b5b_0_0:notes"/>
+          <p:cNvSpPr txBox="1"/>
+          <p:nvPr>
+            <p:ph idx="1" type="body"/>
+          </p:nvPr>
+        </p:nvSpPr>
+        <p:spPr>
+          <a:xfrm>
+            <a:off x="685800" y="4343400"/>
+            <a:ext cx="5486400" cy="4114800"/>
+          </a:xfrm>
+          <a:prstGeom prst="rect">
+            <a:avLst/>
+          </a:prstGeom>
+          <a:noFill/>
+          <a:ln>
+            <a:noFill/>
+          </a:ln>
+        </p:spPr>
+        <p:txBody>
+          <a:bodyPr anchorCtr="0" anchor="t" bIns="91425" lIns="91425" spcFirstLastPara="1" rIns="91425" wrap="square" tIns="91425">
+            <a:noAutofit/>
+          </a:bodyPr>
+          <a:lstStyle/>
+          <a:p>
+            <a:pPr indent="0" lvl="0" marL="0" rtl="0" algn="l">
+              <a:lnSpc>
+                <a:spcPct val="100000"/>
+              </a:lnSpc>
+              <a:spcBef>
+                <a:spcPts val="0"/>
+              </a:spcBef>
+              <a:spcAft>
+                <a:spcPts val="0"/>
+              </a:spcAft>
+              <a:buSzPts val="1100"/>
+              <a:buNone/>
+            </a:pPr>
+            <a:r>
+              <a:t/>
+            </a:r>
+            <a:endParaRPr/>
+          </a:p>
+        </p:txBody>
+      </p:sp>
+      <p:sp>
+        <p:nvSpPr>
+          <p:cNvPr id="242" name="Google Shape;242;g10056b84b5b_0_0:notes"/>
+          <p:cNvSpPr/>
+          <p:nvPr>
+            <p:ph idx="2" type="sldImg"/>
+          </p:nvPr>
+        </p:nvSpPr>
+        <p:spPr>
+          <a:xfrm>
+            <a:off x="381000" y="685800"/>
+            <a:ext cx="6096000" cy="3429000"/>
+          </a:xfrm>
+          <a:custGeom>
+            <a:rect b="b" l="l" r="r" t="t"/>
+            <a:pathLst>
+              <a:path extrusionOk="0" h="120000" w="120000">
+                <a:moveTo>
+                  <a:pt x="0" y="0"/>
+                </a:moveTo>
+                <a:lnTo>
+                  <a:pt x="120000" y="0"/>
+                </a:lnTo>
+                <a:lnTo>
+                  <a:pt x="120000" y="120000"/>
+                </a:lnTo>
+                <a:lnTo>
+                  <a:pt x="0" y="120000"/>
+                </a:lnTo>
+                <a:close/>
+              </a:path>
+            </a:pathLst>
+          </a:custGeom>
+          <a:noFill/>
+          <a:ln cap="flat" cmpd="sng" w="9525">
+            <a:solidFill>
+              <a:srgbClr val="000000"/>
+            </a:solidFill>
+            <a:prstDash val="solid"/>
+            <a:round/>
+            <a:headEnd len="sm" w="sm" type="none"/>
+            <a:tailEnd len="sm" w="sm" type="none"/>
+          </a:ln>
+        </p:spPr>
+      </p:sp>
+    </p:spTree>
+  </p:cSld>
+  <p:clrMapOvr>
+    <a:masterClrMapping/>
+  </p:clrMapOvr>
+</p:notes>
+</file>
+
+<file path=ppt/notesSlides/notesSlide17.xml><?xml version="1.0" encoding="utf-8"?>
+<p:notes xmlns:a="http://schemas.openxmlformats.org/drawingml/2006/main" xmlns:r="http://schemas.openxmlformats.org/officeDocument/2006/relationships" xmlns:mc="http://schemas.openxmlformats.org/markup-compatibility/2006" xmlns:mv="urn:schemas-microsoft-com:mac:vml" xmlns:p="http://schemas.openxmlformats.org/presentationml/2006/main" xmlns:c="http://schemas.openxmlformats.org/drawingml/2006/chart" xmlns:dgm="http://schemas.openxmlformats.org/drawingml/2006/diagram" xmlns:o="urn:schemas-microsoft-com:office:office" xmlns:v="urn:schemas-microsoft-com:vml" xmlns:pvml="urn:schemas-microsoft-com:office:powerpoint" xmlns:com="http://schemas.openxmlformats.org/drawingml/2006/compatibility" xmlns:p14="http://schemas.microsoft.com/office/powerpoint/2010/main" xmlns:p15="http://schemas.microsoft.com/office/powerpoint/2012/main" xmlns:ahyp="http://schemas.microsoft.com/office/drawing/2018/hyperlinkcolor" showMasterPhAnim="0" showMasterSp="0">
+  <p:cSld>
+    <p:spTree>
+      <p:nvGrpSpPr>
+        <p:cNvPr id="247" name="Shape 247"/>
+        <p:cNvGrpSpPr/>
+        <p:nvPr/>
+      </p:nvGrpSpPr>
+      <p:grpSpPr>
+        <a:xfrm>
+          <a:off x="0" y="0"/>
+          <a:ext cx="0" cy="0"/>
+          <a:chOff x="0" y="0"/>
+          <a:chExt cx="0" cy="0"/>
+        </a:xfrm>
+      </p:grpSpPr>
+      <p:sp>
+        <p:nvSpPr>
+          <p:cNvPr id="248" name="Google Shape;248;p36:notes"/>
           <p:cNvSpPr txBox="1"/>
           <p:nvPr>
             <p:ph idx="1" type="body"/>
@@ -1724,7 +1851,7 @@
       </p:sp>
       <p:sp>
         <p:nvSpPr>
-          <p:cNvPr id="242" name="Google Shape;242;p36:notes"/>
+          <p:cNvPr id="249" name="Google Shape;249;p36:notes"/>
           <p:cNvSpPr/>
           <p:nvPr>
             <p:ph idx="2" type="sldImg"/>
@@ -19436,8 +19563,20 @@
 </file>
 
 <file path=ppt/slides/slide16.xml><?xml version="1.0" encoding="utf-8"?>
-<p:sld xmlns:a="http://schemas.openxmlformats.org/drawingml/2006/main" xmlns:r="http://schemas.openxmlformats.org/officeDocument/2006/relationships" xmlns:mc="http://schemas.openxmlformats.org/markup-compatibility/2006" xmlns:mv="urn:schemas-microsoft-com:mac:vml" xmlns:p="http://schemas.openxmlformats.org/presentationml/2006/main" xmlns:c="http://schemas.openxmlformats.org/drawingml/2006/chart" xmlns:dgm="http://schemas.openxmlformats.org/drawingml/2006/diagram" xmlns:o="urn:schemas-microsoft-com:office:office" xmlns:v="urn:schemas-microsoft-com:vml" xmlns:pvml="urn:schemas-microsoft-com:office:powerpoint" xmlns:com="http://schemas.openxmlformats.org/drawingml/2006/compatibility" xmlns:p14="http://schemas.microsoft.com/office/powerpoint/2010/main" xmlns:p15="http://schemas.microsoft.com/office/powerpoint/2012/main" xmlns:ahyp="http://schemas.microsoft.com/office/drawing/2018/hyperlinkcolor">
+<p:sld xmlns:a="http://schemas.openxmlformats.org/drawingml/2006/main" xmlns:r="http://schemas.openxmlformats.org/officeDocument/2006/relationships" xmlns:mc="http://schemas.openxmlformats.org/markup-compatibility/2006" xmlns:mv="urn:schemas-microsoft-com:mac:vml" xmlns:p="http://schemas.openxmlformats.org/presentationml/2006/main" xmlns:c="http://schemas.openxmlformats.org/drawingml/2006/chart" xmlns:dgm="http://schemas.openxmlformats.org/drawingml/2006/diagram" xmlns:o="urn:schemas-microsoft-com:office:office" xmlns:v="urn:schemas-microsoft-com:vml" xmlns:pvml="urn:schemas-microsoft-com:office:powerpoint" xmlns:com="http://schemas.openxmlformats.org/drawingml/2006/compatibility" xmlns:p14="http://schemas.microsoft.com/office/powerpoint/2010/main" xmlns:p15="http://schemas.microsoft.com/office/powerpoint/2012/main" xmlns:ahyp="http://schemas.microsoft.com/office/drawing/2018/hyperlinkcolor" showMasterSp="0">
   <p:cSld>
+    <p:bg>
+      <p:bgPr>
+        <a:blipFill>
+          <a:blip r:embed="rId3">
+            <a:alphaModFix/>
+          </a:blip>
+          <a:stretch>
+            <a:fillRect/>
+          </a:stretch>
+        </a:blipFill>
+      </p:bgPr>
+    </p:bg>
     <p:spTree>
       <p:nvGrpSpPr>
         <p:cNvPr id="243" name="Shape 243"/>
@@ -19452,9 +19591,313 @@
           <a:chExt cx="0" cy="0"/>
         </a:xfrm>
       </p:grpSpPr>
+      <p:sp>
+        <p:nvSpPr>
+          <p:cNvPr id="244" name="Google Shape;244;g10056b84b5b_0_0"/>
+          <p:cNvSpPr txBox="1"/>
+          <p:nvPr/>
+        </p:nvSpPr>
+        <p:spPr>
+          <a:xfrm>
+            <a:off x="800110" y="884052"/>
+            <a:ext cx="7543800" cy="1088100"/>
+          </a:xfrm>
+          <a:prstGeom prst="rect">
+            <a:avLst/>
+          </a:prstGeom>
+          <a:noFill/>
+          <a:ln>
+            <a:noFill/>
+          </a:ln>
+        </p:spPr>
+        <p:txBody>
+          <a:bodyPr anchorCtr="0" anchor="b" bIns="34275" lIns="68575" spcFirstLastPara="1" rIns="68575" wrap="square" tIns="34275">
+            <a:noAutofit/>
+          </a:bodyPr>
+          <a:lstStyle/>
+          <a:p>
+            <a:pPr indent="0" lvl="0" marL="0" rtl="0" algn="l">
+              <a:lnSpc>
+                <a:spcPct val="85000"/>
+              </a:lnSpc>
+              <a:spcBef>
+                <a:spcPts val="0"/>
+              </a:spcBef>
+              <a:spcAft>
+                <a:spcPts val="0"/>
+              </a:spcAft>
+              <a:buNone/>
+            </a:pPr>
+            <a:r>
+              <a:rPr b="1" lang="es" sz="3000">
+                <a:solidFill>
+                  <a:srgbClr val="E72E5F"/>
+                </a:solidFill>
+              </a:rPr>
+              <a:t>Seguimiento</a:t>
+            </a:r>
+            <a:r>
+              <a:rPr b="1" lang="es" sz="3000">
+                <a:solidFill>
+                  <a:srgbClr val="375FA9"/>
+                </a:solidFill>
+              </a:rPr>
+              <a:t> Habilidades</a:t>
+            </a:r>
+            <a:endParaRPr b="1" sz="3000">
+              <a:solidFill>
+                <a:srgbClr val="375FA9"/>
+              </a:solidFill>
+            </a:endParaRPr>
+          </a:p>
+          <a:p>
+            <a:pPr indent="0" lvl="0" marL="0" rtl="0" algn="l">
+              <a:lnSpc>
+                <a:spcPct val="85000"/>
+              </a:lnSpc>
+              <a:spcBef>
+                <a:spcPts val="0"/>
+              </a:spcBef>
+              <a:spcAft>
+                <a:spcPts val="0"/>
+              </a:spcAft>
+              <a:buNone/>
+            </a:pPr>
+            <a:r>
+              <a:rPr b="1" lang="es" sz="3000">
+                <a:solidFill>
+                  <a:srgbClr val="375FA9"/>
+                </a:solidFill>
+              </a:rPr>
+              <a:t>Digitales en Programación</a:t>
+            </a:r>
+            <a:endParaRPr b="1" sz="3200">
+              <a:solidFill>
+                <a:srgbClr val="E73263"/>
+              </a:solidFill>
+            </a:endParaRPr>
+          </a:p>
+        </p:txBody>
+      </p:sp>
+      <p:sp>
+        <p:nvSpPr>
+          <p:cNvPr id="245" name="Google Shape;245;g10056b84b5b_0_0"/>
+          <p:cNvSpPr txBox="1"/>
+          <p:nvPr/>
+        </p:nvSpPr>
+        <p:spPr>
+          <a:xfrm>
+            <a:off x="931725" y="3925975"/>
+            <a:ext cx="6261600" cy="1088100"/>
+          </a:xfrm>
+          <a:prstGeom prst="rect">
+            <a:avLst/>
+          </a:prstGeom>
+          <a:noFill/>
+          <a:ln>
+            <a:noFill/>
+          </a:ln>
+        </p:spPr>
+        <p:txBody>
+          <a:bodyPr anchorCtr="0" anchor="t" bIns="34275" lIns="0" spcFirstLastPara="1" rIns="0" wrap="square" tIns="34275">
+            <a:noAutofit/>
+          </a:bodyPr>
+          <a:lstStyle/>
+          <a:p>
+            <a:pPr indent="0" lvl="0" marL="0" rtl="0" algn="ctr">
+              <a:lnSpc>
+                <a:spcPct val="85000"/>
+              </a:lnSpc>
+              <a:spcBef>
+                <a:spcPts val="0"/>
+              </a:spcBef>
+              <a:spcAft>
+                <a:spcPts val="0"/>
+              </a:spcAft>
+              <a:buNone/>
+            </a:pPr>
+            <a:r>
+              <a:rPr b="1" lang="es" sz="1200">
+                <a:solidFill>
+                  <a:srgbClr val="375FA9"/>
+                </a:solidFill>
+              </a:rPr>
+              <a:t>Completa la siguiente encuesta para darnos retroalimentación sobre esta semana</a:t>
+            </a:r>
+            <a:r>
+              <a:rPr b="1" lang="es">
+                <a:solidFill>
+                  <a:srgbClr val="375FA9"/>
+                </a:solidFill>
+              </a:rPr>
+              <a:t> </a:t>
+            </a:r>
+            <a:r>
+              <a:rPr b="1" lang="es">
+                <a:solidFill>
+                  <a:srgbClr val="375FA9"/>
+                </a:solidFill>
+                <a:latin typeface="Times New Roman"/>
+                <a:ea typeface="Times New Roman"/>
+                <a:cs typeface="Times New Roman"/>
+                <a:sym typeface="Times New Roman"/>
+              </a:rPr>
+              <a:t>▼▼▼</a:t>
+            </a:r>
+            <a:endParaRPr b="1">
+              <a:solidFill>
+                <a:srgbClr val="375FA9"/>
+              </a:solidFill>
+              <a:latin typeface="Times New Roman"/>
+              <a:ea typeface="Times New Roman"/>
+              <a:cs typeface="Times New Roman"/>
+              <a:sym typeface="Times New Roman"/>
+            </a:endParaRPr>
+          </a:p>
+          <a:p>
+            <a:pPr indent="0" lvl="0" marL="0" rtl="0" algn="ctr">
+              <a:lnSpc>
+                <a:spcPct val="85000"/>
+              </a:lnSpc>
+              <a:spcBef>
+                <a:spcPts val="0"/>
+              </a:spcBef>
+              <a:spcAft>
+                <a:spcPts val="0"/>
+              </a:spcAft>
+              <a:buNone/>
+            </a:pPr>
+            <a:r>
+              <a:rPr b="1" lang="es" sz="1500" u="sng">
+                <a:solidFill>
+                  <a:srgbClr val="E73263"/>
+                </a:solidFill>
+                <a:hlinkClick r:id="rId4">
+                  <a:extLst>
+                    <a:ext uri="{A12FA001-AC4F-418D-AE19-62706E023703}">
+                      <ahyp:hlinkClr val="tx"/>
+                    </a:ext>
+                  </a:extLst>
+                </a:hlinkClick>
+              </a:rPr>
+              <a:t>https://www.questionpro.com/t/ALw8TZlxOJ</a:t>
+            </a:r>
+            <a:endParaRPr b="1" sz="1500" u="sng">
+              <a:solidFill>
+                <a:srgbClr val="E73263"/>
+              </a:solidFill>
+            </a:endParaRPr>
+          </a:p>
+          <a:p>
+            <a:pPr indent="0" lvl="0" marL="0" rtl="0" algn="just">
+              <a:lnSpc>
+                <a:spcPct val="90000"/>
+              </a:lnSpc>
+              <a:spcBef>
+                <a:spcPts val="900"/>
+              </a:spcBef>
+              <a:spcAft>
+                <a:spcPts val="0"/>
+              </a:spcAft>
+              <a:buNone/>
+            </a:pPr>
+            <a:r>
+              <a:t/>
+            </a:r>
+            <a:endParaRPr sz="1000">
+              <a:solidFill>
+                <a:srgbClr val="375FA9"/>
+              </a:solidFill>
+              <a:latin typeface="Roboto"/>
+              <a:ea typeface="Roboto"/>
+              <a:cs typeface="Roboto"/>
+              <a:sym typeface="Roboto"/>
+            </a:endParaRPr>
+          </a:p>
+          <a:p>
+            <a:pPr indent="0" lvl="0" marL="0" rtl="0" algn="just">
+              <a:lnSpc>
+                <a:spcPct val="90000"/>
+              </a:lnSpc>
+              <a:spcBef>
+                <a:spcPts val="900"/>
+              </a:spcBef>
+              <a:spcAft>
+                <a:spcPts val="0"/>
+              </a:spcAft>
+              <a:buNone/>
+            </a:pPr>
+            <a:r>
+              <a:t/>
+            </a:r>
+            <a:endParaRPr sz="1000">
+              <a:solidFill>
+                <a:srgbClr val="375FA9"/>
+              </a:solidFill>
+              <a:latin typeface="Roboto"/>
+              <a:ea typeface="Roboto"/>
+              <a:cs typeface="Roboto"/>
+              <a:sym typeface="Roboto"/>
+            </a:endParaRPr>
+          </a:p>
+        </p:txBody>
+      </p:sp>
       <p:pic>
         <p:nvPicPr>
-          <p:cNvPr id="244" name="Google Shape;244;p36"/>
+          <p:cNvPr id="246" name="Google Shape;246;g10056b84b5b_0_0"/>
+          <p:cNvPicPr preferRelativeResize="0"/>
+          <p:nvPr/>
+        </p:nvPicPr>
+        <p:blipFill>
+          <a:blip r:embed="rId5">
+            <a:alphaModFix/>
+          </a:blip>
+          <a:stretch>
+            <a:fillRect/>
+          </a:stretch>
+        </p:blipFill>
+        <p:spPr>
+          <a:xfrm>
+            <a:off x="998013" y="1928075"/>
+            <a:ext cx="6129025" cy="1939125"/>
+          </a:xfrm>
+          <a:prstGeom prst="rect">
+            <a:avLst/>
+          </a:prstGeom>
+          <a:noFill/>
+          <a:ln>
+            <a:noFill/>
+          </a:ln>
+        </p:spPr>
+      </p:pic>
+    </p:spTree>
+  </p:cSld>
+  <p:clrMapOvr>
+    <a:masterClrMapping/>
+  </p:clrMapOvr>
+</p:sld>
+</file>
+
+<file path=ppt/slides/slide17.xml><?xml version="1.0" encoding="utf-8"?>
+<p:sld xmlns:a="http://schemas.openxmlformats.org/drawingml/2006/main" xmlns:r="http://schemas.openxmlformats.org/officeDocument/2006/relationships" xmlns:mc="http://schemas.openxmlformats.org/markup-compatibility/2006" xmlns:mv="urn:schemas-microsoft-com:mac:vml" xmlns:p="http://schemas.openxmlformats.org/presentationml/2006/main" xmlns:c="http://schemas.openxmlformats.org/drawingml/2006/chart" xmlns:dgm="http://schemas.openxmlformats.org/drawingml/2006/diagram" xmlns:o="urn:schemas-microsoft-com:office:office" xmlns:v="urn:schemas-microsoft-com:vml" xmlns:pvml="urn:schemas-microsoft-com:office:powerpoint" xmlns:com="http://schemas.openxmlformats.org/drawingml/2006/compatibility" xmlns:p14="http://schemas.microsoft.com/office/powerpoint/2010/main" xmlns:p15="http://schemas.microsoft.com/office/powerpoint/2012/main" xmlns:ahyp="http://schemas.microsoft.com/office/drawing/2018/hyperlinkcolor">
+  <p:cSld>
+    <p:spTree>
+      <p:nvGrpSpPr>
+        <p:cNvPr id="250" name="Shape 250"/>
+        <p:cNvGrpSpPr/>
+        <p:nvPr/>
+      </p:nvGrpSpPr>
+      <p:grpSpPr>
+        <a:xfrm>
+          <a:off x="0" y="0"/>
+          <a:ext cx="0" cy="0"/>
+          <a:chOff x="0" y="0"/>
+          <a:chExt cx="0" cy="0"/>
+        </a:xfrm>
+      </p:grpSpPr>
+      <p:pic>
+        <p:nvPicPr>
+          <p:cNvPr id="251" name="Google Shape;251;p36"/>
           <p:cNvPicPr preferRelativeResize="0"/>
           <p:nvPr/>
         </p:nvPicPr>

</xml_diff>